<commit_message>
Mudanças p/ nova correção de atividade incompleta
</commit_message>
<xml_diff>
--- a/Powerpoint Apresentação Encontro Remoto 2 SA 1 Unidade 9.pptx
+++ b/Powerpoint Apresentação Encontro Remoto 2 SA 1 Unidade 9.pptx
@@ -17,6 +17,9 @@
     <p:sldId id="262" r:id="rId12"/>
     <p:sldId id="263" r:id="rId13"/>
     <p:sldId id="264" r:id="rId14"/>
+    <p:sldId id="265" r:id="rId15"/>
+    <p:sldId id="266" r:id="rId16"/>
+    <p:sldId id="267" r:id="rId17"/>
   </p:sldIdLst>
   <p:sldSz cy="5143500" cx="9144000"/>
   <p:notesSz cx="6858000" cy="9144000"/>
@@ -793,6 +796,303 @@
 </p:notes>
 </file>
 
+<file path=ppt/notesSlides/notesSlide10.xml><?xml version="1.0" encoding="utf-8"?>
+<p:notes xmlns:a="http://schemas.openxmlformats.org/drawingml/2006/main" xmlns:r="http://schemas.openxmlformats.org/officeDocument/2006/relationships" xmlns:mc="http://schemas.openxmlformats.org/markup-compatibility/2006" xmlns:mv="urn:schemas-microsoft-com:mac:vml" xmlns:p="http://schemas.openxmlformats.org/presentationml/2006/main" xmlns:c="http://schemas.openxmlformats.org/drawingml/2006/chart" xmlns:dgm="http://schemas.openxmlformats.org/drawingml/2006/diagram" xmlns:o="urn:schemas-microsoft-com:office:office" xmlns:v="urn:schemas-microsoft-com:vml" xmlns:pvml="urn:schemas-microsoft-com:office:powerpoint" xmlns:com="http://schemas.openxmlformats.org/drawingml/2006/compatibility" xmlns:p14="http://schemas.microsoft.com/office/powerpoint/2010/main" xmlns:p15="http://schemas.microsoft.com/office/powerpoint/2012/main" xmlns:ahyp="http://schemas.microsoft.com/office/drawing/2018/hyperlinkcolor" showMasterPhAnim="0" showMasterSp="0">
+  <p:cSld>
+    <p:spTree>
+      <p:nvGrpSpPr>
+        <p:cNvPr id="108" name="Shape 108"/>
+        <p:cNvGrpSpPr/>
+        <p:nvPr/>
+      </p:nvGrpSpPr>
+      <p:grpSpPr>
+        <a:xfrm>
+          <a:off x="0" y="0"/>
+          <a:ext cx="0" cy="0"/>
+          <a:chOff x="0" y="0"/>
+          <a:chExt cx="0" cy="0"/>
+        </a:xfrm>
+      </p:grpSpPr>
+      <p:sp>
+        <p:nvSpPr>
+          <p:cNvPr id="109" name="Google Shape;109;g1169fa14b1a_0_5:notes"/>
+          <p:cNvSpPr/>
+          <p:nvPr>
+            <p:ph idx="2" type="sldImg"/>
+          </p:nvPr>
+        </p:nvSpPr>
+        <p:spPr>
+          <a:xfrm>
+            <a:off x="381300" y="685800"/>
+            <a:ext cx="6096000" cy="3429000"/>
+          </a:xfrm>
+          <a:custGeom>
+            <a:rect b="b" l="l" r="r" t="t"/>
+            <a:pathLst>
+              <a:path extrusionOk="0" h="120000" w="120000">
+                <a:moveTo>
+                  <a:pt x="0" y="0"/>
+                </a:moveTo>
+                <a:lnTo>
+                  <a:pt x="120000" y="0"/>
+                </a:lnTo>
+                <a:lnTo>
+                  <a:pt x="120000" y="120000"/>
+                </a:lnTo>
+                <a:lnTo>
+                  <a:pt x="0" y="120000"/>
+                </a:lnTo>
+                <a:close/>
+              </a:path>
+            </a:pathLst>
+          </a:custGeom>
+        </p:spPr>
+      </p:sp>
+      <p:sp>
+        <p:nvSpPr>
+          <p:cNvPr id="110" name="Google Shape;110;g1169fa14b1a_0_5:notes"/>
+          <p:cNvSpPr txBox="1"/>
+          <p:nvPr>
+            <p:ph idx="1" type="body"/>
+          </p:nvPr>
+        </p:nvSpPr>
+        <p:spPr>
+          <a:xfrm>
+            <a:off x="685800" y="4343400"/>
+            <a:ext cx="5486400" cy="4114800"/>
+          </a:xfrm>
+          <a:prstGeom prst="rect">
+            <a:avLst/>
+          </a:prstGeom>
+        </p:spPr>
+        <p:txBody>
+          <a:bodyPr anchorCtr="0" anchor="t" bIns="91425" lIns="91425" spcFirstLastPara="1" rIns="91425" wrap="square" tIns="91425">
+            <a:noAutofit/>
+          </a:bodyPr>
+          <a:lstStyle/>
+          <a:p>
+            <a:pPr indent="0" lvl="0" marL="0" rtl="0" algn="l">
+              <a:spcBef>
+                <a:spcPts val="0"/>
+              </a:spcBef>
+              <a:spcAft>
+                <a:spcPts val="0"/>
+              </a:spcAft>
+              <a:buNone/>
+            </a:pPr>
+            <a:r>
+              <a:t/>
+            </a:r>
+            <a:endParaRPr/>
+          </a:p>
+        </p:txBody>
+      </p:sp>
+    </p:spTree>
+  </p:cSld>
+  <p:clrMapOvr>
+    <a:masterClrMapping/>
+  </p:clrMapOvr>
+</p:notes>
+</file>
+
+<file path=ppt/notesSlides/notesSlide11.xml><?xml version="1.0" encoding="utf-8"?>
+<p:notes xmlns:a="http://schemas.openxmlformats.org/drawingml/2006/main" xmlns:r="http://schemas.openxmlformats.org/officeDocument/2006/relationships" xmlns:mc="http://schemas.openxmlformats.org/markup-compatibility/2006" xmlns:mv="urn:schemas-microsoft-com:mac:vml" xmlns:p="http://schemas.openxmlformats.org/presentationml/2006/main" xmlns:c="http://schemas.openxmlformats.org/drawingml/2006/chart" xmlns:dgm="http://schemas.openxmlformats.org/drawingml/2006/diagram" xmlns:o="urn:schemas-microsoft-com:office:office" xmlns:v="urn:schemas-microsoft-com:vml" xmlns:pvml="urn:schemas-microsoft-com:office:powerpoint" xmlns:com="http://schemas.openxmlformats.org/drawingml/2006/compatibility" xmlns:p14="http://schemas.microsoft.com/office/powerpoint/2010/main" xmlns:p15="http://schemas.microsoft.com/office/powerpoint/2012/main" xmlns:ahyp="http://schemas.microsoft.com/office/drawing/2018/hyperlinkcolor" showMasterPhAnim="0" showMasterSp="0">
+  <p:cSld>
+    <p:spTree>
+      <p:nvGrpSpPr>
+        <p:cNvPr id="114" name="Shape 114"/>
+        <p:cNvGrpSpPr/>
+        <p:nvPr/>
+      </p:nvGrpSpPr>
+      <p:grpSpPr>
+        <a:xfrm>
+          <a:off x="0" y="0"/>
+          <a:ext cx="0" cy="0"/>
+          <a:chOff x="0" y="0"/>
+          <a:chExt cx="0" cy="0"/>
+        </a:xfrm>
+      </p:grpSpPr>
+      <p:sp>
+        <p:nvSpPr>
+          <p:cNvPr id="115" name="Google Shape;115;g1169fa14b1a_0_12:notes"/>
+          <p:cNvSpPr/>
+          <p:nvPr>
+            <p:ph idx="2" type="sldImg"/>
+          </p:nvPr>
+        </p:nvSpPr>
+        <p:spPr>
+          <a:xfrm>
+            <a:off x="381300" y="685800"/>
+            <a:ext cx="6096000" cy="3429000"/>
+          </a:xfrm>
+          <a:custGeom>
+            <a:rect b="b" l="l" r="r" t="t"/>
+            <a:pathLst>
+              <a:path extrusionOk="0" h="120000" w="120000">
+                <a:moveTo>
+                  <a:pt x="0" y="0"/>
+                </a:moveTo>
+                <a:lnTo>
+                  <a:pt x="120000" y="0"/>
+                </a:lnTo>
+                <a:lnTo>
+                  <a:pt x="120000" y="120000"/>
+                </a:lnTo>
+                <a:lnTo>
+                  <a:pt x="0" y="120000"/>
+                </a:lnTo>
+                <a:close/>
+              </a:path>
+            </a:pathLst>
+          </a:custGeom>
+        </p:spPr>
+      </p:sp>
+      <p:sp>
+        <p:nvSpPr>
+          <p:cNvPr id="116" name="Google Shape;116;g1169fa14b1a_0_12:notes"/>
+          <p:cNvSpPr txBox="1"/>
+          <p:nvPr>
+            <p:ph idx="1" type="body"/>
+          </p:nvPr>
+        </p:nvSpPr>
+        <p:spPr>
+          <a:xfrm>
+            <a:off x="685800" y="4343400"/>
+            <a:ext cx="5486400" cy="4114800"/>
+          </a:xfrm>
+          <a:prstGeom prst="rect">
+            <a:avLst/>
+          </a:prstGeom>
+        </p:spPr>
+        <p:txBody>
+          <a:bodyPr anchorCtr="0" anchor="t" bIns="91425" lIns="91425" spcFirstLastPara="1" rIns="91425" wrap="square" tIns="91425">
+            <a:noAutofit/>
+          </a:bodyPr>
+          <a:lstStyle/>
+          <a:p>
+            <a:pPr indent="0" lvl="0" marL="0" rtl="0" algn="l">
+              <a:spcBef>
+                <a:spcPts val="0"/>
+              </a:spcBef>
+              <a:spcAft>
+                <a:spcPts val="0"/>
+              </a:spcAft>
+              <a:buNone/>
+            </a:pPr>
+            <a:r>
+              <a:t/>
+            </a:r>
+            <a:endParaRPr/>
+          </a:p>
+        </p:txBody>
+      </p:sp>
+    </p:spTree>
+  </p:cSld>
+  <p:clrMapOvr>
+    <a:masterClrMapping/>
+  </p:clrMapOvr>
+</p:notes>
+</file>
+
+<file path=ppt/notesSlides/notesSlide12.xml><?xml version="1.0" encoding="utf-8"?>
+<p:notes xmlns:a="http://schemas.openxmlformats.org/drawingml/2006/main" xmlns:r="http://schemas.openxmlformats.org/officeDocument/2006/relationships" xmlns:mc="http://schemas.openxmlformats.org/markup-compatibility/2006" xmlns:mv="urn:schemas-microsoft-com:mac:vml" xmlns:p="http://schemas.openxmlformats.org/presentationml/2006/main" xmlns:c="http://schemas.openxmlformats.org/drawingml/2006/chart" xmlns:dgm="http://schemas.openxmlformats.org/drawingml/2006/diagram" xmlns:o="urn:schemas-microsoft-com:office:office" xmlns:v="urn:schemas-microsoft-com:vml" xmlns:pvml="urn:schemas-microsoft-com:office:powerpoint" xmlns:com="http://schemas.openxmlformats.org/drawingml/2006/compatibility" xmlns:p14="http://schemas.microsoft.com/office/powerpoint/2010/main" xmlns:p15="http://schemas.microsoft.com/office/powerpoint/2012/main" xmlns:ahyp="http://schemas.microsoft.com/office/drawing/2018/hyperlinkcolor" showMasterPhAnim="0" showMasterSp="0">
+  <p:cSld>
+    <p:spTree>
+      <p:nvGrpSpPr>
+        <p:cNvPr id="120" name="Shape 120"/>
+        <p:cNvGrpSpPr/>
+        <p:nvPr/>
+      </p:nvGrpSpPr>
+      <p:grpSpPr>
+        <a:xfrm>
+          <a:off x="0" y="0"/>
+          <a:ext cx="0" cy="0"/>
+          <a:chOff x="0" y="0"/>
+          <a:chExt cx="0" cy="0"/>
+        </a:xfrm>
+      </p:grpSpPr>
+      <p:sp>
+        <p:nvSpPr>
+          <p:cNvPr id="121" name="Google Shape;121;g10d3648db42_0_132:notes"/>
+          <p:cNvSpPr/>
+          <p:nvPr>
+            <p:ph idx="2" type="sldImg"/>
+          </p:nvPr>
+        </p:nvSpPr>
+        <p:spPr>
+          <a:xfrm>
+            <a:off x="381300" y="685800"/>
+            <a:ext cx="6096000" cy="3429000"/>
+          </a:xfrm>
+          <a:custGeom>
+            <a:rect b="b" l="l" r="r" t="t"/>
+            <a:pathLst>
+              <a:path extrusionOk="0" h="120000" w="120000">
+                <a:moveTo>
+                  <a:pt x="0" y="0"/>
+                </a:moveTo>
+                <a:lnTo>
+                  <a:pt x="120000" y="0"/>
+                </a:lnTo>
+                <a:lnTo>
+                  <a:pt x="120000" y="120000"/>
+                </a:lnTo>
+                <a:lnTo>
+                  <a:pt x="0" y="120000"/>
+                </a:lnTo>
+                <a:close/>
+              </a:path>
+            </a:pathLst>
+          </a:custGeom>
+        </p:spPr>
+      </p:sp>
+      <p:sp>
+        <p:nvSpPr>
+          <p:cNvPr id="122" name="Google Shape;122;g10d3648db42_0_132:notes"/>
+          <p:cNvSpPr txBox="1"/>
+          <p:nvPr>
+            <p:ph idx="1" type="body"/>
+          </p:nvPr>
+        </p:nvSpPr>
+        <p:spPr>
+          <a:xfrm>
+            <a:off x="685800" y="4343400"/>
+            <a:ext cx="5486400" cy="4114800"/>
+          </a:xfrm>
+          <a:prstGeom prst="rect">
+            <a:avLst/>
+          </a:prstGeom>
+        </p:spPr>
+        <p:txBody>
+          <a:bodyPr anchorCtr="0" anchor="t" bIns="91425" lIns="91425" spcFirstLastPara="1" rIns="91425" wrap="square" tIns="91425">
+            <a:noAutofit/>
+          </a:bodyPr>
+          <a:lstStyle/>
+          <a:p>
+            <a:pPr indent="0" lvl="0" marL="0" rtl="0" algn="l">
+              <a:spcBef>
+                <a:spcPts val="0"/>
+              </a:spcBef>
+              <a:spcAft>
+                <a:spcPts val="0"/>
+              </a:spcAft>
+              <a:buNone/>
+            </a:pPr>
+            <a:r>
+              <a:t/>
+            </a:r>
+            <a:endParaRPr/>
+          </a:p>
+        </p:txBody>
+      </p:sp>
+    </p:spTree>
+  </p:cSld>
+  <p:clrMapOvr>
+    <a:masterClrMapping/>
+  </p:clrMapOvr>
+</p:notes>
+</file>
+
 <file path=ppt/notesSlides/notesSlide2.xml><?xml version="1.0" encoding="utf-8"?>
 <p:notes xmlns:a="http://schemas.openxmlformats.org/drawingml/2006/main" xmlns:r="http://schemas.openxmlformats.org/officeDocument/2006/relationships" xmlns:mc="http://schemas.openxmlformats.org/markup-compatibility/2006" xmlns:mv="urn:schemas-microsoft-com:mac:vml" xmlns:p="http://schemas.openxmlformats.org/presentationml/2006/main" xmlns:c="http://schemas.openxmlformats.org/drawingml/2006/chart" xmlns:dgm="http://schemas.openxmlformats.org/drawingml/2006/diagram" xmlns:o="urn:schemas-microsoft-com:office:office" xmlns:v="urn:schemas-microsoft-com:vml" xmlns:pvml="urn:schemas-microsoft-com:office:powerpoint" xmlns:com="http://schemas.openxmlformats.org/drawingml/2006/compatibility" xmlns:p14="http://schemas.microsoft.com/office/powerpoint/2010/main" xmlns:p15="http://schemas.microsoft.com/office/powerpoint/2012/main" xmlns:ahyp="http://schemas.microsoft.com/office/drawing/2018/hyperlinkcolor" showMasterPhAnim="0" showMasterSp="0">
   <p:cSld>
@@ -996,7 +1296,7 @@
   <p:cSld>
     <p:spTree>
       <p:nvGrpSpPr>
-        <p:cNvPr id="71" name="Shape 71"/>
+        <p:cNvPr id="70" name="Shape 70"/>
         <p:cNvGrpSpPr/>
         <p:nvPr/>
       </p:nvGrpSpPr>
@@ -1010,7 +1310,7 @@
       </p:grpSpPr>
       <p:sp>
         <p:nvSpPr>
-          <p:cNvPr id="72" name="Google Shape;72;g10d3648db42_0_14:notes"/>
+          <p:cNvPr id="71" name="Google Shape;71;g10d3648db42_0_14:notes"/>
           <p:cNvSpPr/>
           <p:nvPr>
             <p:ph idx="2" type="sldImg"/>
@@ -1045,7 +1345,7 @@
       </p:sp>
       <p:sp>
         <p:nvSpPr>
-          <p:cNvPr id="73" name="Google Shape;73;g10d3648db42_0_14:notes"/>
+          <p:cNvPr id="72" name="Google Shape;72;g10d3648db42_0_14:notes"/>
           <p:cNvSpPr txBox="1"/>
           <p:nvPr>
             <p:ph idx="1" type="body"/>
@@ -1095,7 +1395,7 @@
   <p:cSld>
     <p:spTree>
       <p:nvGrpSpPr>
-        <p:cNvPr id="77" name="Shape 77"/>
+        <p:cNvPr id="76" name="Shape 76"/>
         <p:cNvGrpSpPr/>
         <p:nvPr/>
       </p:nvGrpSpPr>
@@ -1109,7 +1409,7 @@
       </p:grpSpPr>
       <p:sp>
         <p:nvSpPr>
-          <p:cNvPr id="78" name="Google Shape;78;g10d3648db42_0_25:notes"/>
+          <p:cNvPr id="77" name="Google Shape;77;g10d3648db42_0_25:notes"/>
           <p:cNvSpPr/>
           <p:nvPr>
             <p:ph idx="2" type="sldImg"/>
@@ -1144,7 +1444,7 @@
       </p:sp>
       <p:sp>
         <p:nvSpPr>
-          <p:cNvPr id="79" name="Google Shape;79;g10d3648db42_0_25:notes"/>
+          <p:cNvPr id="78" name="Google Shape;78;g10d3648db42_0_25:notes"/>
           <p:cNvSpPr txBox="1"/>
           <p:nvPr>
             <p:ph idx="1" type="body"/>
@@ -1194,7 +1494,7 @@
   <p:cSld>
     <p:spTree>
       <p:nvGrpSpPr>
-        <p:cNvPr id="83" name="Shape 83"/>
+        <p:cNvPr id="82" name="Shape 82"/>
         <p:cNvGrpSpPr/>
         <p:nvPr/>
       </p:nvGrpSpPr>
@@ -1208,7 +1508,7 @@
       </p:grpSpPr>
       <p:sp>
         <p:nvSpPr>
-          <p:cNvPr id="84" name="Google Shape;84;g10d3648db42_0_32:notes"/>
+          <p:cNvPr id="83" name="Google Shape;83;g10d3648db42_0_32:notes"/>
           <p:cNvSpPr/>
           <p:nvPr>
             <p:ph idx="2" type="sldImg"/>
@@ -1243,7 +1543,7 @@
       </p:sp>
       <p:sp>
         <p:nvSpPr>
-          <p:cNvPr id="85" name="Google Shape;85;g10d3648db42_0_32:notes"/>
+          <p:cNvPr id="84" name="Google Shape;84;g10d3648db42_0_32:notes"/>
           <p:cNvSpPr txBox="1"/>
           <p:nvPr>
             <p:ph idx="1" type="body"/>
@@ -1293,7 +1593,7 @@
   <p:cSld>
     <p:spTree>
       <p:nvGrpSpPr>
-        <p:cNvPr id="90" name="Shape 90"/>
+        <p:cNvPr id="89" name="Shape 89"/>
         <p:cNvGrpSpPr/>
         <p:nvPr/>
       </p:nvGrpSpPr>
@@ -1307,7 +1607,7 @@
       </p:grpSpPr>
       <p:sp>
         <p:nvSpPr>
-          <p:cNvPr id="91" name="Google Shape;91;g10d3648db42_0_38:notes"/>
+          <p:cNvPr id="90" name="Google Shape;90;g10d3648db42_0_38:notes"/>
           <p:cNvSpPr/>
           <p:nvPr>
             <p:ph idx="2" type="sldImg"/>
@@ -1342,7 +1642,7 @@
       </p:sp>
       <p:sp>
         <p:nvSpPr>
-          <p:cNvPr id="92" name="Google Shape;92;g10d3648db42_0_38:notes"/>
+          <p:cNvPr id="91" name="Google Shape;91;g10d3648db42_0_38:notes"/>
           <p:cNvSpPr txBox="1"/>
           <p:nvPr>
             <p:ph idx="1" type="body"/>
@@ -1392,7 +1692,7 @@
   <p:cSld>
     <p:spTree>
       <p:nvGrpSpPr>
-        <p:cNvPr id="97" name="Shape 97"/>
+        <p:cNvPr id="95" name="Shape 95"/>
         <p:cNvGrpSpPr/>
         <p:nvPr/>
       </p:nvGrpSpPr>
@@ -1406,7 +1706,7 @@
       </p:grpSpPr>
       <p:sp>
         <p:nvSpPr>
-          <p:cNvPr id="98" name="Google Shape;98;g10d3648db42_0_45:notes"/>
+          <p:cNvPr id="96" name="Google Shape;96;g10d3648db42_0_45:notes"/>
           <p:cNvSpPr/>
           <p:nvPr>
             <p:ph idx="2" type="sldImg"/>
@@ -1441,7 +1741,7 @@
       </p:sp>
       <p:sp>
         <p:nvSpPr>
-          <p:cNvPr id="99" name="Google Shape;99;g10d3648db42_0_45:notes"/>
+          <p:cNvPr id="97" name="Google Shape;97;g10d3648db42_0_45:notes"/>
           <p:cNvSpPr txBox="1"/>
           <p:nvPr>
             <p:ph idx="1" type="body"/>
@@ -1491,7 +1791,7 @@
   <p:cSld>
     <p:spTree>
       <p:nvGrpSpPr>
-        <p:cNvPr id="104" name="Shape 104"/>
+        <p:cNvPr id="102" name="Shape 102"/>
         <p:cNvGrpSpPr/>
         <p:nvPr/>
       </p:nvGrpSpPr>
@@ -1505,7 +1805,7 @@
       </p:grpSpPr>
       <p:sp>
         <p:nvSpPr>
-          <p:cNvPr id="105" name="Google Shape;105;g10d3648db42_0_132:notes"/>
+          <p:cNvPr id="103" name="Google Shape;103;g1169fa14b1a_0_0:notes"/>
           <p:cNvSpPr/>
           <p:nvPr>
             <p:ph idx="2" type="sldImg"/>
@@ -1540,7 +1840,7 @@
       </p:sp>
       <p:sp>
         <p:nvSpPr>
-          <p:cNvPr id="106" name="Google Shape;106;g10d3648db42_0_132:notes"/>
+          <p:cNvPr id="104" name="Google Shape;104;g1169fa14b1a_0_0:notes"/>
           <p:cNvSpPr txBox="1"/>
           <p:nvPr>
             <p:ph idx="1" type="body"/>
@@ -6310,6 +6610,280 @@
 </p:sld>
 </file>
 
+<file path=ppt/slides/slide10.xml><?xml version="1.0" encoding="utf-8"?>
+<p:sld xmlns:a="http://schemas.openxmlformats.org/drawingml/2006/main" xmlns:r="http://schemas.openxmlformats.org/officeDocument/2006/relationships" xmlns:mc="http://schemas.openxmlformats.org/markup-compatibility/2006" xmlns:mv="urn:schemas-microsoft-com:mac:vml" xmlns:p="http://schemas.openxmlformats.org/presentationml/2006/main" xmlns:c="http://schemas.openxmlformats.org/drawingml/2006/chart" xmlns:dgm="http://schemas.openxmlformats.org/drawingml/2006/diagram" xmlns:o="urn:schemas-microsoft-com:office:office" xmlns:v="urn:schemas-microsoft-com:vml" xmlns:pvml="urn:schemas-microsoft-com:office:powerpoint" xmlns:com="http://schemas.openxmlformats.org/drawingml/2006/compatibility" xmlns:p14="http://schemas.microsoft.com/office/powerpoint/2010/main" xmlns:p15="http://schemas.microsoft.com/office/powerpoint/2012/main" xmlns:ahyp="http://schemas.microsoft.com/office/drawing/2018/hyperlinkcolor">
+  <p:cSld>
+    <p:spTree>
+      <p:nvGrpSpPr>
+        <p:cNvPr id="111" name="Shape 111"/>
+        <p:cNvGrpSpPr/>
+        <p:nvPr/>
+      </p:nvGrpSpPr>
+      <p:grpSpPr>
+        <a:xfrm>
+          <a:off x="0" y="0"/>
+          <a:ext cx="0" cy="0"/>
+          <a:chOff x="0" y="0"/>
+          <a:chExt cx="0" cy="0"/>
+        </a:xfrm>
+      </p:grpSpPr>
+      <p:sp>
+        <p:nvSpPr>
+          <p:cNvPr id="112" name="Google Shape;112;p22"/>
+          <p:cNvSpPr txBox="1"/>
+          <p:nvPr>
+            <p:ph type="title"/>
+          </p:nvPr>
+        </p:nvSpPr>
+        <p:spPr>
+          <a:xfrm>
+            <a:off x="265500" y="1233175"/>
+            <a:ext cx="4045200" cy="1482300"/>
+          </a:xfrm>
+          <a:prstGeom prst="rect">
+            <a:avLst/>
+          </a:prstGeom>
+        </p:spPr>
+        <p:txBody>
+          <a:bodyPr anchorCtr="0" anchor="b" bIns="91425" lIns="91425" spcFirstLastPara="1" rIns="91425" wrap="square" tIns="91425">
+            <a:normAutofit/>
+          </a:bodyPr>
+          <a:lstStyle/>
+          <a:p>
+            <a:pPr indent="0" lvl="0" marL="0" rtl="0" algn="ctr">
+              <a:spcBef>
+                <a:spcPts val="0"/>
+              </a:spcBef>
+              <a:spcAft>
+                <a:spcPts val="0"/>
+              </a:spcAft>
+              <a:buNone/>
+            </a:pPr>
+            <a:r>
+              <a:rPr lang="pt-BR"/>
+              <a:t>UX, UI e Design Interativo</a:t>
+            </a:r>
+            <a:endParaRPr/>
+          </a:p>
+        </p:txBody>
+      </p:sp>
+      <p:sp>
+        <p:nvSpPr>
+          <p:cNvPr id="113" name="Google Shape;113;p22"/>
+          <p:cNvSpPr txBox="1"/>
+          <p:nvPr>
+            <p:ph idx="1" type="subTitle"/>
+          </p:nvPr>
+        </p:nvSpPr>
+        <p:spPr>
+          <a:xfrm>
+            <a:off x="265500" y="2803075"/>
+            <a:ext cx="4045200" cy="1235100"/>
+          </a:xfrm>
+          <a:prstGeom prst="rect">
+            <a:avLst/>
+          </a:prstGeom>
+        </p:spPr>
+        <p:txBody>
+          <a:bodyPr anchorCtr="0" anchor="t" bIns="91425" lIns="91425" spcFirstLastPara="1" rIns="91425" wrap="square" tIns="91425">
+            <a:normAutofit/>
+          </a:bodyPr>
+          <a:lstStyle/>
+          <a:p>
+            <a:pPr indent="0" lvl="0" marL="0" rtl="0" algn="ctr">
+              <a:spcBef>
+                <a:spcPts val="0"/>
+              </a:spcBef>
+              <a:spcAft>
+                <a:spcPts val="0"/>
+              </a:spcAft>
+              <a:buNone/>
+            </a:pPr>
+            <a:r>
+              <a:rPr lang="pt-BR"/>
+              <a:t>De que maneira respondem os sites desenvolvidos a estes princípios</a:t>
+            </a:r>
+            <a:endParaRPr/>
+          </a:p>
+        </p:txBody>
+      </p:sp>
+    </p:spTree>
+  </p:cSld>
+  <p:clrMapOvr>
+    <a:masterClrMapping/>
+  </p:clrMapOvr>
+</p:sld>
+</file>
+
+<file path=ppt/slides/slide11.xml><?xml version="1.0" encoding="utf-8"?>
+<p:sld xmlns:a="http://schemas.openxmlformats.org/drawingml/2006/main" xmlns:r="http://schemas.openxmlformats.org/officeDocument/2006/relationships" xmlns:mc="http://schemas.openxmlformats.org/markup-compatibility/2006" xmlns:mv="urn:schemas-microsoft-com:mac:vml" xmlns:p="http://schemas.openxmlformats.org/presentationml/2006/main" xmlns:c="http://schemas.openxmlformats.org/drawingml/2006/chart" xmlns:dgm="http://schemas.openxmlformats.org/drawingml/2006/diagram" xmlns:o="urn:schemas-microsoft-com:office:office" xmlns:v="urn:schemas-microsoft-com:vml" xmlns:pvml="urn:schemas-microsoft-com:office:powerpoint" xmlns:com="http://schemas.openxmlformats.org/drawingml/2006/compatibility" xmlns:p14="http://schemas.microsoft.com/office/powerpoint/2010/main" xmlns:p15="http://schemas.microsoft.com/office/powerpoint/2012/main" xmlns:ahyp="http://schemas.microsoft.com/office/drawing/2018/hyperlinkcolor">
+  <p:cSld>
+    <p:spTree>
+      <p:nvGrpSpPr>
+        <p:cNvPr id="117" name="Shape 117"/>
+        <p:cNvGrpSpPr/>
+        <p:nvPr/>
+      </p:nvGrpSpPr>
+      <p:grpSpPr>
+        <a:xfrm>
+          <a:off x="0" y="0"/>
+          <a:ext cx="0" cy="0"/>
+          <a:chOff x="0" y="0"/>
+          <a:chExt cx="0" cy="0"/>
+        </a:xfrm>
+      </p:grpSpPr>
+      <p:sp>
+        <p:nvSpPr>
+          <p:cNvPr id="118" name="Google Shape;118;p23"/>
+          <p:cNvSpPr txBox="1"/>
+          <p:nvPr>
+            <p:ph type="title"/>
+          </p:nvPr>
+        </p:nvSpPr>
+        <p:spPr>
+          <a:xfrm>
+            <a:off x="265500" y="1233175"/>
+            <a:ext cx="4045200" cy="1482300"/>
+          </a:xfrm>
+          <a:prstGeom prst="rect">
+            <a:avLst/>
+          </a:prstGeom>
+        </p:spPr>
+        <p:txBody>
+          <a:bodyPr anchorCtr="0" anchor="b" bIns="91425" lIns="91425" spcFirstLastPara="1" rIns="91425" wrap="square" tIns="91425">
+            <a:normAutofit/>
+          </a:bodyPr>
+          <a:lstStyle/>
+          <a:p>
+            <a:pPr indent="0" lvl="0" marL="0" rtl="0" algn="ctr">
+              <a:spcBef>
+                <a:spcPts val="0"/>
+              </a:spcBef>
+              <a:spcAft>
+                <a:spcPts val="0"/>
+              </a:spcAft>
+              <a:buNone/>
+            </a:pPr>
+            <a:r>
+              <a:rPr lang="pt-BR"/>
+              <a:t>Dificuldades</a:t>
+            </a:r>
+            <a:endParaRPr i="1"/>
+          </a:p>
+        </p:txBody>
+      </p:sp>
+      <p:sp>
+        <p:nvSpPr>
+          <p:cNvPr id="119" name="Google Shape;119;p23"/>
+          <p:cNvSpPr txBox="1"/>
+          <p:nvPr>
+            <p:ph idx="1" type="subTitle"/>
+          </p:nvPr>
+        </p:nvSpPr>
+        <p:spPr>
+          <a:xfrm>
+            <a:off x="265500" y="2803075"/>
+            <a:ext cx="4045200" cy="1235100"/>
+          </a:xfrm>
+          <a:prstGeom prst="rect">
+            <a:avLst/>
+          </a:prstGeom>
+        </p:spPr>
+        <p:txBody>
+          <a:bodyPr anchorCtr="0" anchor="t" bIns="91425" lIns="91425" spcFirstLastPara="1" rIns="91425" wrap="square" tIns="91425">
+            <a:normAutofit/>
+          </a:bodyPr>
+          <a:lstStyle/>
+          <a:p>
+            <a:pPr indent="0" lvl="0" marL="0" rtl="0" algn="ctr">
+              <a:spcBef>
+                <a:spcPts val="0"/>
+              </a:spcBef>
+              <a:spcAft>
+                <a:spcPts val="0"/>
+              </a:spcAft>
+              <a:buNone/>
+            </a:pPr>
+            <a:r>
+              <a:rPr lang="pt-BR"/>
+              <a:t>Dificuldades de </a:t>
+            </a:r>
+            <a:r>
+              <a:rPr lang="pt-BR"/>
+              <a:t>desenvolvimento para desktop, tablet e smartphone</a:t>
+            </a:r>
+            <a:endParaRPr/>
+          </a:p>
+        </p:txBody>
+      </p:sp>
+    </p:spTree>
+  </p:cSld>
+  <p:clrMapOvr>
+    <a:masterClrMapping/>
+  </p:clrMapOvr>
+</p:sld>
+</file>
+
+<file path=ppt/slides/slide12.xml><?xml version="1.0" encoding="utf-8"?>
+<p:sld xmlns:a="http://schemas.openxmlformats.org/drawingml/2006/main" xmlns:r="http://schemas.openxmlformats.org/officeDocument/2006/relationships" xmlns:mc="http://schemas.openxmlformats.org/markup-compatibility/2006" xmlns:mv="urn:schemas-microsoft-com:mac:vml" xmlns:p="http://schemas.openxmlformats.org/presentationml/2006/main" xmlns:c="http://schemas.openxmlformats.org/drawingml/2006/chart" xmlns:dgm="http://schemas.openxmlformats.org/drawingml/2006/diagram" xmlns:o="urn:schemas-microsoft-com:office:office" xmlns:v="urn:schemas-microsoft-com:vml" xmlns:pvml="urn:schemas-microsoft-com:office:powerpoint" xmlns:com="http://schemas.openxmlformats.org/drawingml/2006/compatibility" xmlns:p14="http://schemas.microsoft.com/office/powerpoint/2010/main" xmlns:p15="http://schemas.microsoft.com/office/powerpoint/2012/main" xmlns:ahyp="http://schemas.microsoft.com/office/drawing/2018/hyperlinkcolor">
+  <p:cSld>
+    <p:bg>
+      <p:bgPr>
+        <a:solidFill>
+          <a:srgbClr val="929292"/>
+        </a:solidFill>
+      </p:bgPr>
+    </p:bg>
+    <p:spTree>
+      <p:nvGrpSpPr>
+        <p:cNvPr id="123" name="Shape 123"/>
+        <p:cNvGrpSpPr/>
+        <p:nvPr/>
+      </p:nvGrpSpPr>
+      <p:grpSpPr>
+        <a:xfrm>
+          <a:off x="0" y="0"/>
+          <a:ext cx="0" cy="0"/>
+          <a:chOff x="0" y="0"/>
+          <a:chExt cx="0" cy="0"/>
+        </a:xfrm>
+      </p:grpSpPr>
+      <p:pic>
+        <p:nvPicPr>
+          <p:cNvPr id="124" name="Google Shape;124;p24"/>
+          <p:cNvPicPr preferRelativeResize="0"/>
+          <p:nvPr/>
+        </p:nvPicPr>
+        <p:blipFill>
+          <a:blip r:embed="rId3">
+            <a:alphaModFix/>
+          </a:blip>
+          <a:stretch>
+            <a:fillRect/>
+          </a:stretch>
+        </p:blipFill>
+        <p:spPr>
+          <a:xfrm>
+            <a:off x="2786050" y="2276463"/>
+            <a:ext cx="3571875" cy="590550"/>
+          </a:xfrm>
+          <a:prstGeom prst="rect">
+            <a:avLst/>
+          </a:prstGeom>
+          <a:noFill/>
+          <a:ln>
+            <a:noFill/>
+          </a:ln>
+        </p:spPr>
+      </p:pic>
+    </p:spTree>
+  </p:cSld>
+  <p:clrMapOvr>
+    <a:masterClrMapping/>
+  </p:clrMapOvr>
+</p:sld>
+</file>
+
 <file path=ppt/slides/slide2.xml><?xml version="1.0" encoding="utf-8"?>
 <p:sld xmlns:a="http://schemas.openxmlformats.org/drawingml/2006/main" xmlns:r="http://schemas.openxmlformats.org/officeDocument/2006/relationships" xmlns:mc="http://schemas.openxmlformats.org/markup-compatibility/2006" xmlns:mv="urn:schemas-microsoft-com:mac:vml" xmlns:p="http://schemas.openxmlformats.org/presentationml/2006/main" xmlns:c="http://schemas.openxmlformats.org/drawingml/2006/chart" xmlns:dgm="http://schemas.openxmlformats.org/drawingml/2006/diagram" xmlns:o="urn:schemas-microsoft-com:office:office" xmlns:v="urn:schemas-microsoft-com:vml" xmlns:pvml="urn:schemas-microsoft-com:office:powerpoint" xmlns:com="http://schemas.openxmlformats.org/drawingml/2006/compatibility" xmlns:p14="http://schemas.microsoft.com/office/powerpoint/2010/main" xmlns:p15="http://schemas.microsoft.com/office/powerpoint/2012/main" xmlns:ahyp="http://schemas.microsoft.com/office/drawing/2018/hyperlinkcolor">
   <p:cSld>
@@ -6719,45 +7293,6 @@
           <p:cNvPr id="69" name="Google Shape;69;p15"/>
           <p:cNvSpPr txBox="1"/>
           <p:nvPr>
-            <p:ph idx="2" type="body"/>
-          </p:nvPr>
-        </p:nvSpPr>
-        <p:spPr>
-          <a:xfrm>
-            <a:off x="4939500" y="724075"/>
-            <a:ext cx="3837000" cy="3695100"/>
-          </a:xfrm>
-          <a:prstGeom prst="rect">
-            <a:avLst/>
-          </a:prstGeom>
-        </p:spPr>
-        <p:txBody>
-          <a:bodyPr anchorCtr="0" anchor="ctr" bIns="91425" lIns="91425" spcFirstLastPara="1" rIns="91425" wrap="square" tIns="91425">
-            <a:normAutofit/>
-          </a:bodyPr>
-          <a:lstStyle/>
-          <a:p>
-            <a:pPr indent="0" lvl="0" marL="0" rtl="0" algn="l">
-              <a:spcBef>
-                <a:spcPts val="0"/>
-              </a:spcBef>
-              <a:spcAft>
-                <a:spcPts val="1200"/>
-              </a:spcAft>
-              <a:buNone/>
-            </a:pPr>
-            <a:r>
-              <a:t/>
-            </a:r>
-            <a:endParaRPr/>
-          </a:p>
-        </p:txBody>
-      </p:sp>
-      <p:sp>
-        <p:nvSpPr>
-          <p:cNvPr id="70" name="Google Shape;70;p15"/>
-          <p:cNvSpPr txBox="1"/>
-          <p:nvPr>
             <p:ph idx="1" type="subTitle"/>
           </p:nvPr>
         </p:nvSpPr>
@@ -6829,7 +7364,7 @@
     </p:bg>
     <p:spTree>
       <p:nvGrpSpPr>
-        <p:cNvPr id="74" name="Shape 74"/>
+        <p:cNvPr id="73" name="Shape 73"/>
         <p:cNvGrpSpPr/>
         <p:nvPr/>
       </p:nvGrpSpPr>
@@ -6843,7 +7378,7 @@
       </p:grpSpPr>
       <p:sp>
         <p:nvSpPr>
-          <p:cNvPr id="75" name="Google Shape;75;p16"/>
+          <p:cNvPr id="74" name="Google Shape;74;p16"/>
           <p:cNvSpPr txBox="1"/>
           <p:nvPr>
             <p:ph idx="1" type="body"/>
@@ -6883,7 +7418,7 @@
       </p:sp>
       <p:pic>
         <p:nvPicPr>
-          <p:cNvPr id="76" name="Google Shape;76;p16"/>
+          <p:cNvPr id="75" name="Google Shape;75;p16"/>
           <p:cNvPicPr preferRelativeResize="0"/>
           <p:nvPr/>
         </p:nvPicPr>
@@ -6922,7 +7457,7 @@
   <p:cSld>
     <p:spTree>
       <p:nvGrpSpPr>
-        <p:cNvPr id="80" name="Shape 80"/>
+        <p:cNvPr id="79" name="Shape 79"/>
         <p:cNvGrpSpPr/>
         <p:nvPr/>
       </p:nvGrpSpPr>
@@ -6936,7 +7471,7 @@
       </p:grpSpPr>
       <p:sp>
         <p:nvSpPr>
-          <p:cNvPr id="81" name="Google Shape;81;p17"/>
+          <p:cNvPr id="80" name="Google Shape;80;p17"/>
           <p:cNvSpPr txBox="1"/>
           <p:nvPr>
             <p:ph type="title"/>
@@ -6980,7 +7515,7 @@
       </p:sp>
       <p:sp>
         <p:nvSpPr>
-          <p:cNvPr id="82" name="Google Shape;82;p17"/>
+          <p:cNvPr id="81" name="Google Shape;81;p17"/>
           <p:cNvSpPr txBox="1"/>
           <p:nvPr>
             <p:ph idx="1" type="subTitle"/>
@@ -7054,7 +7589,7 @@
     </p:bg>
     <p:spTree>
       <p:nvGrpSpPr>
-        <p:cNvPr id="86" name="Shape 86"/>
+        <p:cNvPr id="85" name="Shape 85"/>
         <p:cNvGrpSpPr/>
         <p:nvPr/>
       </p:nvGrpSpPr>
@@ -7068,7 +7603,7 @@
       </p:grpSpPr>
       <p:sp>
         <p:nvSpPr>
-          <p:cNvPr id="87" name="Google Shape;87;p18"/>
+          <p:cNvPr id="86" name="Google Shape;86;p18"/>
           <p:cNvSpPr txBox="1"/>
           <p:nvPr>
             <p:ph idx="1" type="body"/>
@@ -7108,7 +7643,7 @@
       </p:sp>
       <p:pic>
         <p:nvPicPr>
-          <p:cNvPr id="88" name="Google Shape;88;p18"/>
+          <p:cNvPr id="87" name="Google Shape;87;p18"/>
           <p:cNvPicPr preferRelativeResize="0"/>
           <p:nvPr/>
         </p:nvPicPr>
@@ -7136,7 +7671,7 @@
       </p:pic>
       <p:pic>
         <p:nvPicPr>
-          <p:cNvPr id="89" name="Google Shape;89;p18"/>
+          <p:cNvPr id="88" name="Google Shape;88;p18"/>
           <p:cNvPicPr preferRelativeResize="0"/>
           <p:nvPr/>
         </p:nvPicPr>
@@ -7175,7 +7710,7 @@
   <p:cSld>
     <p:spTree>
       <p:nvGrpSpPr>
-        <p:cNvPr id="93" name="Shape 93"/>
+        <p:cNvPr id="92" name="Shape 92"/>
         <p:cNvGrpSpPr/>
         <p:nvPr/>
       </p:nvGrpSpPr>
@@ -7189,7 +7724,7 @@
       </p:grpSpPr>
       <p:sp>
         <p:nvSpPr>
-          <p:cNvPr id="94" name="Google Shape;94;p19"/>
+          <p:cNvPr id="93" name="Google Shape;93;p19"/>
           <p:cNvSpPr txBox="1"/>
           <p:nvPr>
             <p:ph type="title"/>
@@ -7233,46 +7768,7 @@
       </p:sp>
       <p:sp>
         <p:nvSpPr>
-          <p:cNvPr id="95" name="Google Shape;95;p19"/>
-          <p:cNvSpPr txBox="1"/>
-          <p:nvPr>
-            <p:ph idx="2" type="body"/>
-          </p:nvPr>
-        </p:nvSpPr>
-        <p:spPr>
-          <a:xfrm>
-            <a:off x="4939500" y="724075"/>
-            <a:ext cx="3837000" cy="3695100"/>
-          </a:xfrm>
-          <a:prstGeom prst="rect">
-            <a:avLst/>
-          </a:prstGeom>
-        </p:spPr>
-        <p:txBody>
-          <a:bodyPr anchorCtr="0" anchor="ctr" bIns="91425" lIns="91425" spcFirstLastPara="1" rIns="91425" wrap="square" tIns="91425">
-            <a:normAutofit/>
-          </a:bodyPr>
-          <a:lstStyle/>
-          <a:p>
-            <a:pPr indent="0" lvl="0" marL="0" rtl="0" algn="l">
-              <a:spcBef>
-                <a:spcPts val="0"/>
-              </a:spcBef>
-              <a:spcAft>
-                <a:spcPts val="1200"/>
-              </a:spcAft>
-              <a:buNone/>
-            </a:pPr>
-            <a:r>
-              <a:t/>
-            </a:r>
-            <a:endParaRPr/>
-          </a:p>
-        </p:txBody>
-      </p:sp>
-      <p:sp>
-        <p:nvSpPr>
-          <p:cNvPr id="96" name="Google Shape;96;p19"/>
+          <p:cNvPr id="94" name="Google Shape;94;p19"/>
           <p:cNvSpPr txBox="1"/>
           <p:nvPr>
             <p:ph idx="1" type="subTitle"/>
@@ -7346,7 +7842,7 @@
     </p:bg>
     <p:spTree>
       <p:nvGrpSpPr>
-        <p:cNvPr id="100" name="Shape 100"/>
+        <p:cNvPr id="98" name="Shape 98"/>
         <p:cNvGrpSpPr/>
         <p:nvPr/>
       </p:nvGrpSpPr>
@@ -7360,7 +7856,7 @@
       </p:grpSpPr>
       <p:sp>
         <p:nvSpPr>
-          <p:cNvPr id="101" name="Google Shape;101;p20"/>
+          <p:cNvPr id="99" name="Google Shape;99;p20"/>
           <p:cNvSpPr txBox="1"/>
           <p:nvPr>
             <p:ph idx="1" type="body"/>
@@ -7400,7 +7896,7 @@
       </p:sp>
       <p:pic>
         <p:nvPicPr>
-          <p:cNvPr id="102" name="Google Shape;102;p20"/>
+          <p:cNvPr id="100" name="Google Shape;100;p20"/>
           <p:cNvPicPr preferRelativeResize="0"/>
           <p:nvPr/>
         </p:nvPicPr>
@@ -7428,7 +7924,7 @@
       </p:pic>
       <p:pic>
         <p:nvPicPr>
-          <p:cNvPr id="103" name="Google Shape;103;p20"/>
+          <p:cNvPr id="101" name="Google Shape;101;p20"/>
           <p:cNvPicPr preferRelativeResize="0"/>
           <p:nvPr/>
         </p:nvPicPr>
@@ -7465,16 +7961,9 @@
 <file path=ppt/slides/slide9.xml><?xml version="1.0" encoding="utf-8"?>
 <p:sld xmlns:a="http://schemas.openxmlformats.org/drawingml/2006/main" xmlns:r="http://schemas.openxmlformats.org/officeDocument/2006/relationships" xmlns:mc="http://schemas.openxmlformats.org/markup-compatibility/2006" xmlns:mv="urn:schemas-microsoft-com:mac:vml" xmlns:p="http://schemas.openxmlformats.org/presentationml/2006/main" xmlns:c="http://schemas.openxmlformats.org/drawingml/2006/chart" xmlns:dgm="http://schemas.openxmlformats.org/drawingml/2006/diagram" xmlns:o="urn:schemas-microsoft-com:office:office" xmlns:v="urn:schemas-microsoft-com:vml" xmlns:pvml="urn:schemas-microsoft-com:office:powerpoint" xmlns:com="http://schemas.openxmlformats.org/drawingml/2006/compatibility" xmlns:p14="http://schemas.microsoft.com/office/powerpoint/2010/main" xmlns:p15="http://schemas.microsoft.com/office/powerpoint/2012/main" xmlns:ahyp="http://schemas.microsoft.com/office/drawing/2018/hyperlinkcolor">
   <p:cSld>
-    <p:bg>
-      <p:bgPr>
-        <a:solidFill>
-          <a:srgbClr val="929292"/>
-        </a:solidFill>
-      </p:bgPr>
-    </p:bg>
     <p:spTree>
       <p:nvGrpSpPr>
-        <p:cNvPr id="107" name="Shape 107"/>
+        <p:cNvPr id="105" name="Shape 105"/>
         <p:cNvGrpSpPr/>
         <p:nvPr/>
       </p:nvGrpSpPr>
@@ -7486,34 +7975,86 @@
           <a:chExt cx="0" cy="0"/>
         </a:xfrm>
       </p:grpSpPr>
-      <p:pic>
-        <p:nvPicPr>
-          <p:cNvPr id="108" name="Google Shape;108;p21"/>
-          <p:cNvPicPr preferRelativeResize="0"/>
-          <p:nvPr/>
-        </p:nvPicPr>
-        <p:blipFill>
-          <a:blip r:embed="rId3">
-            <a:alphaModFix/>
-          </a:blip>
-          <a:stretch>
-            <a:fillRect/>
-          </a:stretch>
-        </p:blipFill>
+      <p:sp>
+        <p:nvSpPr>
+          <p:cNvPr id="106" name="Google Shape;106;p21"/>
+          <p:cNvSpPr txBox="1"/>
+          <p:nvPr>
+            <p:ph type="title"/>
+          </p:nvPr>
+        </p:nvSpPr>
         <p:spPr>
           <a:xfrm>
-            <a:off x="2786050" y="2276463"/>
-            <a:ext cx="3571875" cy="590550"/>
+            <a:off x="265500" y="1233175"/>
+            <a:ext cx="4045200" cy="1482300"/>
           </a:xfrm>
           <a:prstGeom prst="rect">
             <a:avLst/>
           </a:prstGeom>
-          <a:noFill/>
-          <a:ln>
-            <a:noFill/>
-          </a:ln>
         </p:spPr>
-      </p:pic>
+        <p:txBody>
+          <a:bodyPr anchorCtr="0" anchor="b" bIns="91425" lIns="91425" spcFirstLastPara="1" rIns="91425" wrap="square" tIns="91425">
+            <a:normAutofit/>
+          </a:bodyPr>
+          <a:lstStyle/>
+          <a:p>
+            <a:pPr indent="0" lvl="0" marL="0" rtl="0" algn="ctr">
+              <a:spcBef>
+                <a:spcPts val="0"/>
+              </a:spcBef>
+              <a:spcAft>
+                <a:spcPts val="0"/>
+              </a:spcAft>
+              <a:buNone/>
+            </a:pPr>
+            <a:r>
+              <a:rPr lang="pt-BR"/>
+              <a:t>Resultados</a:t>
+            </a:r>
+            <a:endParaRPr i="1"/>
+          </a:p>
+        </p:txBody>
+      </p:sp>
+      <p:sp>
+        <p:nvSpPr>
+          <p:cNvPr id="107" name="Google Shape;107;p21"/>
+          <p:cNvSpPr txBox="1"/>
+          <p:nvPr>
+            <p:ph idx="1" type="subTitle"/>
+          </p:nvPr>
+        </p:nvSpPr>
+        <p:spPr>
+          <a:xfrm>
+            <a:off x="265500" y="2803075"/>
+            <a:ext cx="4045200" cy="1235100"/>
+          </a:xfrm>
+          <a:prstGeom prst="rect">
+            <a:avLst/>
+          </a:prstGeom>
+        </p:spPr>
+        <p:txBody>
+          <a:bodyPr anchorCtr="0" anchor="t" bIns="91425" lIns="91425" spcFirstLastPara="1" rIns="91425" wrap="square" tIns="91425">
+            <a:normAutofit/>
+          </a:bodyPr>
+          <a:lstStyle/>
+          <a:p>
+            <a:pPr indent="0" lvl="0" marL="0" rtl="0" algn="ctr">
+              <a:spcBef>
+                <a:spcPts val="0"/>
+              </a:spcBef>
+              <a:spcAft>
+                <a:spcPts val="0"/>
+              </a:spcAft>
+              <a:buNone/>
+            </a:pPr>
+            <a:r>
+              <a:rPr lang="pt-BR"/>
+              <a:t>Revisão das necessidades do briefing</a:t>
+            </a:r>
+            <a:endParaRPr/>
+          </a:p>
+        </p:txBody>
+      </p:sp>
     </p:spTree>
   </p:cSld>
   <p:clrMapOvr>

</xml_diff>